<commit_message>
ajustes apa y models
</commit_message>
<xml_diff>
--- a/input/images/scheme.pptx
+++ b/input/images/scheme.pptx
@@ -6,7 +6,8 @@
   </p:sldMasterIdLst>
   <p:sldIdLst>
     <p:sldId id="257" r:id="rId2"/>
-    <p:sldId id="256" r:id="rId3"/>
+    <p:sldId id="258" r:id="rId3"/>
+    <p:sldId id="256" r:id="rId4"/>
   </p:sldIdLst>
   <p:sldSz cx="7993063" cy="4068763"/>
   <p:notesSz cx="6858000" cy="9144000"/>
@@ -244,7 +245,7 @@
           <a:p>
             <a:fld id="{7C809603-0A2B-4FAA-8CCA-C215CBD5387F}" type="datetimeFigureOut">
               <a:rPr lang="en-US" smtClean="0"/>
-              <a:t>1/12/2023</a:t>
+              <a:t>11/29/2023</a:t>
             </a:fld>
             <a:endParaRPr lang="en-US"/>
           </a:p>
@@ -414,7 +415,7 @@
           <a:p>
             <a:fld id="{7C809603-0A2B-4FAA-8CCA-C215CBD5387F}" type="datetimeFigureOut">
               <a:rPr lang="en-US" smtClean="0"/>
-              <a:t>1/12/2023</a:t>
+              <a:t>11/29/2023</a:t>
             </a:fld>
             <a:endParaRPr lang="en-US"/>
           </a:p>
@@ -594,7 +595,7 @@
           <a:p>
             <a:fld id="{7C809603-0A2B-4FAA-8CCA-C215CBD5387F}" type="datetimeFigureOut">
               <a:rPr lang="en-US" smtClean="0"/>
-              <a:t>1/12/2023</a:t>
+              <a:t>11/29/2023</a:t>
             </a:fld>
             <a:endParaRPr lang="en-US"/>
           </a:p>
@@ -764,7 +765,7 @@
           <a:p>
             <a:fld id="{7C809603-0A2B-4FAA-8CCA-C215CBD5387F}" type="datetimeFigureOut">
               <a:rPr lang="en-US" smtClean="0"/>
-              <a:t>1/12/2023</a:t>
+              <a:t>11/29/2023</a:t>
             </a:fld>
             <a:endParaRPr lang="en-US"/>
           </a:p>
@@ -1010,7 +1011,7 @@
           <a:p>
             <a:fld id="{7C809603-0A2B-4FAA-8CCA-C215CBD5387F}" type="datetimeFigureOut">
               <a:rPr lang="en-US" smtClean="0"/>
-              <a:t>1/12/2023</a:t>
+              <a:t>11/29/2023</a:t>
             </a:fld>
             <a:endParaRPr lang="en-US"/>
           </a:p>
@@ -1242,7 +1243,7 @@
           <a:p>
             <a:fld id="{7C809603-0A2B-4FAA-8CCA-C215CBD5387F}" type="datetimeFigureOut">
               <a:rPr lang="en-US" smtClean="0"/>
-              <a:t>1/12/2023</a:t>
+              <a:t>11/29/2023</a:t>
             </a:fld>
             <a:endParaRPr lang="en-US"/>
           </a:p>
@@ -1609,7 +1610,7 @@
           <a:p>
             <a:fld id="{7C809603-0A2B-4FAA-8CCA-C215CBD5387F}" type="datetimeFigureOut">
               <a:rPr lang="en-US" smtClean="0"/>
-              <a:t>1/12/2023</a:t>
+              <a:t>11/29/2023</a:t>
             </a:fld>
             <a:endParaRPr lang="en-US"/>
           </a:p>
@@ -1727,7 +1728,7 @@
           <a:p>
             <a:fld id="{7C809603-0A2B-4FAA-8CCA-C215CBD5387F}" type="datetimeFigureOut">
               <a:rPr lang="en-US" smtClean="0"/>
-              <a:t>1/12/2023</a:t>
+              <a:t>11/29/2023</a:t>
             </a:fld>
             <a:endParaRPr lang="en-US"/>
           </a:p>
@@ -1822,7 +1823,7 @@
           <a:p>
             <a:fld id="{7C809603-0A2B-4FAA-8CCA-C215CBD5387F}" type="datetimeFigureOut">
               <a:rPr lang="en-US" smtClean="0"/>
-              <a:t>1/12/2023</a:t>
+              <a:t>11/29/2023</a:t>
             </a:fld>
             <a:endParaRPr lang="en-US"/>
           </a:p>
@@ -2099,7 +2100,7 @@
           <a:p>
             <a:fld id="{7C809603-0A2B-4FAA-8CCA-C215CBD5387F}" type="datetimeFigureOut">
               <a:rPr lang="en-US" smtClean="0"/>
-              <a:t>1/12/2023</a:t>
+              <a:t>11/29/2023</a:t>
             </a:fld>
             <a:endParaRPr lang="en-US"/>
           </a:p>
@@ -2356,7 +2357,7 @@
           <a:p>
             <a:fld id="{7C809603-0A2B-4FAA-8CCA-C215CBD5387F}" type="datetimeFigureOut">
               <a:rPr lang="en-US" smtClean="0"/>
-              <a:t>1/12/2023</a:t>
+              <a:t>11/29/2023</a:t>
             </a:fld>
             <a:endParaRPr lang="en-US"/>
           </a:p>
@@ -2569,7 +2570,7 @@
           <a:p>
             <a:fld id="{7C809603-0A2B-4FAA-8CCA-C215CBD5387F}" type="datetimeFigureOut">
               <a:rPr lang="en-US" smtClean="0"/>
-              <a:t>1/12/2023</a:t>
+              <a:t>11/29/2023</a:t>
             </a:fld>
             <a:endParaRPr lang="en-US"/>
           </a:p>
@@ -3014,7 +3015,7 @@
           <a:p>
             <a:pPr algn="ctr"/>
             <a:r>
-              <a:rPr lang="en-GB" sz="1286" dirty="0" smtClean="0">
+              <a:rPr lang="en-GB" sz="1286" dirty="0">
                 <a:solidFill>
                   <a:schemeClr val="tx1"/>
                 </a:solidFill>
@@ -3024,14 +3025,6 @@
               </a:rPr>
               <a:t>Education</a:t>
             </a:r>
-            <a:endParaRPr lang="en-GB" sz="1286" dirty="0">
-              <a:solidFill>
-                <a:schemeClr val="tx1"/>
-              </a:solidFill>
-              <a:latin typeface="Times New Roman" panose="02020603050405020304" pitchFamily="18" charset="0"/>
-              <a:ea typeface="Lato" panose="020F0502020204030203" pitchFamily="34" charset="0"/>
-              <a:cs typeface="Times New Roman" panose="02020603050405020304" pitchFamily="18" charset="0"/>
-            </a:endParaRPr>
           </a:p>
         </p:txBody>
       </p:sp>
@@ -3075,7 +3068,7 @@
           <a:p>
             <a:pPr algn="ctr"/>
             <a:r>
-              <a:rPr lang="en-GB" sz="1286" dirty="0" smtClean="0">
+              <a:rPr lang="en-GB" sz="1286" dirty="0">
                 <a:solidFill>
                   <a:schemeClr val="tx1"/>
                 </a:solidFill>
@@ -3085,14 +3078,6 @@
               </a:rPr>
               <a:t>Income</a:t>
             </a:r>
-            <a:endParaRPr lang="en-GB" sz="1286" dirty="0">
-              <a:solidFill>
-                <a:schemeClr val="tx1"/>
-              </a:solidFill>
-              <a:latin typeface="Times New Roman" panose="02020603050405020304" pitchFamily="18" charset="0"/>
-              <a:ea typeface="Lato" panose="020F0502020204030203" pitchFamily="34" charset="0"/>
-              <a:cs typeface="Times New Roman" panose="02020603050405020304" pitchFamily="18" charset="0"/>
-            </a:endParaRPr>
           </a:p>
         </p:txBody>
       </p:sp>
@@ -3136,7 +3121,7 @@
           <a:p>
             <a:pPr algn="ctr"/>
             <a:r>
-              <a:rPr lang="en-GB" sz="1286" dirty="0" smtClean="0">
+              <a:rPr lang="en-GB" sz="1286" dirty="0">
                 <a:solidFill>
                   <a:schemeClr val="tx1"/>
                 </a:solidFill>
@@ -3146,14 +3131,6 @@
               </a:rPr>
               <a:t>Social class</a:t>
             </a:r>
-            <a:endParaRPr lang="en-GB" sz="1286" dirty="0">
-              <a:solidFill>
-                <a:schemeClr val="tx1"/>
-              </a:solidFill>
-              <a:latin typeface="Times New Roman" panose="02020603050405020304" pitchFamily="18" charset="0"/>
-              <a:ea typeface="Lato" panose="020F0502020204030203" pitchFamily="34" charset="0"/>
-              <a:cs typeface="Times New Roman" panose="02020603050405020304" pitchFamily="18" charset="0"/>
-            </a:endParaRPr>
           </a:p>
         </p:txBody>
       </p:sp>
@@ -3197,7 +3174,7 @@
           <a:p>
             <a:pPr algn="ctr"/>
             <a:r>
-              <a:rPr lang="en-GB" sz="1286" dirty="0" smtClean="0">
+              <a:rPr lang="en-GB" sz="1286" dirty="0">
                 <a:solidFill>
                   <a:schemeClr val="tx1"/>
                 </a:solidFill>
@@ -3211,7 +3188,7 @@
           <a:p>
             <a:pPr algn="ctr"/>
             <a:r>
-              <a:rPr lang="en-GB" sz="1286" dirty="0" smtClean="0">
+              <a:rPr lang="en-GB" sz="1286" dirty="0">
                 <a:solidFill>
                   <a:schemeClr val="tx1"/>
                 </a:solidFill>
@@ -3221,14 +3198,6 @@
               </a:rPr>
               <a:t>Perception</a:t>
             </a:r>
-            <a:endParaRPr lang="en-GB" sz="1286" dirty="0">
-              <a:solidFill>
-                <a:schemeClr val="tx1"/>
-              </a:solidFill>
-              <a:latin typeface="Times New Roman" panose="02020603050405020304" pitchFamily="18" charset="0"/>
-              <a:ea typeface="Lato" panose="020F0502020204030203" pitchFamily="34" charset="0"/>
-              <a:cs typeface="Times New Roman" panose="02020603050405020304" pitchFamily="18" charset="0"/>
-            </a:endParaRPr>
           </a:p>
         </p:txBody>
       </p:sp>
@@ -3377,7 +3346,7 @@
           <a:p>
             <a:pPr algn="ctr"/>
             <a:r>
-              <a:rPr lang="en-GB" sz="1200" dirty="0" smtClean="0">
+              <a:rPr lang="en-GB" sz="1200" dirty="0">
                 <a:solidFill>
                   <a:schemeClr val="tx1"/>
                 </a:solidFill>
@@ -3387,14 +3356,6 @@
               </a:rPr>
               <a:t>Subjective social status</a:t>
             </a:r>
-            <a:endParaRPr lang="en-GB" sz="1200" dirty="0">
-              <a:solidFill>
-                <a:schemeClr val="tx1"/>
-              </a:solidFill>
-              <a:latin typeface="Times New Roman" panose="02020603050405020304" pitchFamily="18" charset="0"/>
-              <a:ea typeface="Lato" panose="020F0502020204030203" pitchFamily="34" charset="0"/>
-              <a:cs typeface="Times New Roman" panose="02020603050405020304" pitchFamily="18" charset="0"/>
-            </a:endParaRPr>
           </a:p>
         </p:txBody>
       </p:sp>
@@ -3439,7 +3400,7 @@
           <p:cNvPr id="21" name="Conector recto de flecha 20">
             <a:extLst>
               <a:ext uri="{FF2B5EF4-FFF2-40B4-BE49-F238E27FC236}">
-                <a16:creationId xmlns:a16="http://schemas.microsoft.com/office/drawing/2014/main" xmlns="" id="{4A4C4BF0-8ECD-4895-8508-B1FFCCDE4B3F}"/>
+                <a16:creationId xmlns:a16="http://schemas.microsoft.com/office/drawing/2014/main" id="{4A4C4BF0-8ECD-4895-8508-B1FFCCDE4B3F}"/>
               </a:ext>
             </a:extLst>
           </p:cNvPr>
@@ -3476,14 +3437,14 @@
           </a:fontRef>
         </p:style>
       </p:cxnSp>
-      <mc:AlternateContent xmlns:mc="http://schemas.openxmlformats.org/markup-compatibility/2006">
-        <mc:Choice xmlns:a14="http://schemas.microsoft.com/office/drawing/2010/main" Requires="a14">
+      <mc:AlternateContent xmlns:mc="http://schemas.openxmlformats.org/markup-compatibility/2006" xmlns:a14="http://schemas.microsoft.com/office/drawing/2010/main">
+        <mc:Choice Requires="a14">
           <p:sp>
             <p:nvSpPr>
               <p:cNvPr id="10" name="CuadroTexto 9">
                 <a:extLst>
                   <a:ext uri="{FF2B5EF4-FFF2-40B4-BE49-F238E27FC236}">
-                    <a16:creationId xmlns:a16="http://schemas.microsoft.com/office/drawing/2014/main" xmlns="" id="{8C5B2872-328E-49A9-9409-7B43744BEA2B}"/>
+                    <a16:creationId xmlns:a16="http://schemas.microsoft.com/office/drawing/2014/main" id="{8C5B2872-328E-49A9-9409-7B43744BEA2B}"/>
                   </a:ext>
                 </a:extLst>
               </p:cNvPr>
@@ -3570,7 +3531,7 @@
             </p:txBody>
           </p:sp>
         </mc:Choice>
-        <mc:Fallback>
+        <mc:Fallback xmlns="">
           <p:sp>
             <p:nvSpPr>
               <p:cNvPr id="10" name="CuadroTexto 9">
@@ -3615,14 +3576,14 @@
           </p:sp>
         </mc:Fallback>
       </mc:AlternateContent>
-      <mc:AlternateContent xmlns:mc="http://schemas.openxmlformats.org/markup-compatibility/2006">
-        <mc:Choice xmlns:a14="http://schemas.microsoft.com/office/drawing/2010/main" Requires="a14">
+      <mc:AlternateContent xmlns:mc="http://schemas.openxmlformats.org/markup-compatibility/2006" xmlns:a14="http://schemas.microsoft.com/office/drawing/2010/main">
+        <mc:Choice Requires="a14">
           <p:sp>
             <p:nvSpPr>
               <p:cNvPr id="25" name="CuadroTexto 24">
                 <a:extLst>
                   <a:ext uri="{FF2B5EF4-FFF2-40B4-BE49-F238E27FC236}">
-                    <a16:creationId xmlns:a16="http://schemas.microsoft.com/office/drawing/2014/main" xmlns="" id="{F55E9C88-8DB4-4D07-9D5F-105FDCF6F8A0}"/>
+                    <a16:creationId xmlns:a16="http://schemas.microsoft.com/office/drawing/2014/main" id="{F55E9C88-8DB4-4D07-9D5F-105FDCF6F8A0}"/>
                   </a:ext>
                 </a:extLst>
               </p:cNvPr>
@@ -3709,7 +3670,7 @@
             </p:txBody>
           </p:sp>
         </mc:Choice>
-        <mc:Fallback>
+        <mc:Fallback xmlns="">
           <p:sp>
             <p:nvSpPr>
               <p:cNvPr id="25" name="CuadroTexto 24">
@@ -3754,14 +3715,14 @@
           </p:sp>
         </mc:Fallback>
       </mc:AlternateContent>
-      <mc:AlternateContent xmlns:mc="http://schemas.openxmlformats.org/markup-compatibility/2006">
-        <mc:Choice xmlns:a14="http://schemas.microsoft.com/office/drawing/2010/main" Requires="a14">
+      <mc:AlternateContent xmlns:mc="http://schemas.openxmlformats.org/markup-compatibility/2006" xmlns:a14="http://schemas.microsoft.com/office/drawing/2010/main">
+        <mc:Choice Requires="a14">
           <p:sp>
             <p:nvSpPr>
               <p:cNvPr id="26" name="CuadroTexto 25">
                 <a:extLst>
                   <a:ext uri="{FF2B5EF4-FFF2-40B4-BE49-F238E27FC236}">
-                    <a16:creationId xmlns:a16="http://schemas.microsoft.com/office/drawing/2014/main" xmlns="" id="{F9CF2996-BE9D-42EB-9DD9-1313A1FF151E}"/>
+                    <a16:creationId xmlns:a16="http://schemas.microsoft.com/office/drawing/2014/main" id="{F9CF2996-BE9D-42EB-9DD9-1313A1FF151E}"/>
                   </a:ext>
                 </a:extLst>
               </p:cNvPr>
@@ -3848,7 +3809,7 @@
             </p:txBody>
           </p:sp>
         </mc:Choice>
-        <mc:Fallback>
+        <mc:Fallback xmlns="">
           <p:sp>
             <p:nvSpPr>
               <p:cNvPr id="26" name="CuadroTexto 25">
@@ -3898,7 +3859,7 @@
           <p:cNvPr id="28" name="Conector recto de flecha 27">
             <a:extLst>
               <a:ext uri="{FF2B5EF4-FFF2-40B4-BE49-F238E27FC236}">
-                <a16:creationId xmlns:a16="http://schemas.microsoft.com/office/drawing/2014/main" xmlns="" id="{110395F9-AB89-4A6A-B396-F3C1FBC4B0D2}"/>
+                <a16:creationId xmlns:a16="http://schemas.microsoft.com/office/drawing/2014/main" id="{110395F9-AB89-4A6A-B396-F3C1FBC4B0D2}"/>
               </a:ext>
             </a:extLst>
           </p:cNvPr>
@@ -3940,7 +3901,7 @@
           <p:cNvPr id="31" name="Conector recto de flecha 30">
             <a:extLst>
               <a:ext uri="{FF2B5EF4-FFF2-40B4-BE49-F238E27FC236}">
-                <a16:creationId xmlns:a16="http://schemas.microsoft.com/office/drawing/2014/main" xmlns="" id="{EF32652A-3281-4CE6-BCA9-28DF3F638B4C}"/>
+                <a16:creationId xmlns:a16="http://schemas.microsoft.com/office/drawing/2014/main" id="{EF32652A-3281-4CE6-BCA9-28DF3F638B4C}"/>
               </a:ext>
             </a:extLst>
           </p:cNvPr>
@@ -3977,14 +3938,14 @@
           </a:fontRef>
         </p:style>
       </p:cxnSp>
-      <mc:AlternateContent xmlns:mc="http://schemas.openxmlformats.org/markup-compatibility/2006">
-        <mc:Choice xmlns:a14="http://schemas.microsoft.com/office/drawing/2010/main" Requires="a14">
+      <mc:AlternateContent xmlns:mc="http://schemas.openxmlformats.org/markup-compatibility/2006" xmlns:a14="http://schemas.microsoft.com/office/drawing/2010/main">
+        <mc:Choice Requires="a14">
           <p:sp>
             <p:nvSpPr>
               <p:cNvPr id="36" name="CuadroTexto 35">
                 <a:extLst>
                   <a:ext uri="{FF2B5EF4-FFF2-40B4-BE49-F238E27FC236}">
-                    <a16:creationId xmlns:a16="http://schemas.microsoft.com/office/drawing/2014/main" xmlns="" id="{2FA14FB4-213C-4E79-B533-1C031129435A}"/>
+                    <a16:creationId xmlns:a16="http://schemas.microsoft.com/office/drawing/2014/main" id="{2FA14FB4-213C-4E79-B533-1C031129435A}"/>
                   </a:ext>
                 </a:extLst>
               </p:cNvPr>
@@ -4062,7 +4023,7 @@
             </p:txBody>
           </p:sp>
         </mc:Choice>
-        <mc:Fallback>
+        <mc:Fallback xmlns="">
           <p:sp>
             <p:nvSpPr>
               <p:cNvPr id="36" name="CuadroTexto 35">
@@ -4107,14 +4068,14 @@
           </p:sp>
         </mc:Fallback>
       </mc:AlternateContent>
-      <mc:AlternateContent xmlns:mc="http://schemas.openxmlformats.org/markup-compatibility/2006">
-        <mc:Choice xmlns:a14="http://schemas.microsoft.com/office/drawing/2010/main" Requires="a14">
+      <mc:AlternateContent xmlns:mc="http://schemas.openxmlformats.org/markup-compatibility/2006" xmlns:a14="http://schemas.microsoft.com/office/drawing/2010/main">
+        <mc:Choice Requires="a14">
           <p:sp>
             <p:nvSpPr>
               <p:cNvPr id="37" name="CuadroTexto 36">
                 <a:extLst>
                   <a:ext uri="{FF2B5EF4-FFF2-40B4-BE49-F238E27FC236}">
-                    <a16:creationId xmlns:a16="http://schemas.microsoft.com/office/drawing/2014/main" xmlns="" id="{A07E0013-787A-42E1-B306-241225EE0342}"/>
+                    <a16:creationId xmlns:a16="http://schemas.microsoft.com/office/drawing/2014/main" id="{A07E0013-787A-42E1-B306-241225EE0342}"/>
                   </a:ext>
                 </a:extLst>
               </p:cNvPr>
@@ -4193,7 +4154,7 @@
             </p:txBody>
           </p:sp>
         </mc:Choice>
-        <mc:Fallback>
+        <mc:Fallback xmlns="">
           <p:sp>
             <p:nvSpPr>
               <p:cNvPr id="37" name="CuadroTexto 36">
@@ -4243,7 +4204,7 @@
           <p:cNvPr id="24" name="CuadroTexto 23">
             <a:extLst>
               <a:ext uri="{FF2B5EF4-FFF2-40B4-BE49-F238E27FC236}">
-                <a16:creationId xmlns:a16="http://schemas.microsoft.com/office/drawing/2014/main" xmlns="" id="{20ED6ECD-489B-442A-9F77-D977C45F2099}"/>
+                <a16:creationId xmlns:a16="http://schemas.microsoft.com/office/drawing/2014/main" id="{20ED6ECD-489B-442A-9F77-D977C45F2099}"/>
               </a:ext>
             </a:extLst>
           </p:cNvPr>
@@ -4267,16 +4228,12 @@
           <a:lstStyle/>
           <a:p>
             <a:r>
-              <a:rPr lang="en-GB" sz="1600" dirty="0" smtClean="0">
+              <a:rPr lang="en-GB" sz="1600" dirty="0">
                 <a:latin typeface="Times New Roman" panose="02020603050405020304" pitchFamily="18" charset="0"/>
                 <a:cs typeface="Times New Roman" panose="02020603050405020304" pitchFamily="18" charset="0"/>
               </a:rPr>
               <a:t>+</a:t>
             </a:r>
-            <a:endParaRPr lang="en-GB" sz="1600" dirty="0">
-              <a:latin typeface="Times New Roman" panose="02020603050405020304" pitchFamily="18" charset="0"/>
-              <a:cs typeface="Times New Roman" panose="02020603050405020304" pitchFamily="18" charset="0"/>
-            </a:endParaRPr>
           </a:p>
         </p:txBody>
       </p:sp>
@@ -4285,7 +4242,7 @@
           <p:cNvPr id="39" name="CuadroTexto 38">
             <a:extLst>
               <a:ext uri="{FF2B5EF4-FFF2-40B4-BE49-F238E27FC236}">
-                <a16:creationId xmlns:a16="http://schemas.microsoft.com/office/drawing/2014/main" xmlns="" id="{5730C6D8-C76C-4678-93D3-E5FD2745115B}"/>
+                <a16:creationId xmlns:a16="http://schemas.microsoft.com/office/drawing/2014/main" id="{5730C6D8-C76C-4678-93D3-E5FD2745115B}"/>
               </a:ext>
             </a:extLst>
           </p:cNvPr>
@@ -4309,16 +4266,12 @@
           <a:lstStyle/>
           <a:p>
             <a:r>
-              <a:rPr lang="en-GB" sz="1600" dirty="0" smtClean="0">
+              <a:rPr lang="en-GB" sz="1600" dirty="0">
                 <a:latin typeface="Times New Roman" panose="02020603050405020304" pitchFamily="18" charset="0"/>
                 <a:cs typeface="Times New Roman" panose="02020603050405020304" pitchFamily="18" charset="0"/>
               </a:rPr>
               <a:t>-</a:t>
             </a:r>
-            <a:endParaRPr lang="en-GB" sz="1600" dirty="0">
-              <a:latin typeface="Times New Roman" panose="02020603050405020304" pitchFamily="18" charset="0"/>
-              <a:cs typeface="Times New Roman" panose="02020603050405020304" pitchFamily="18" charset="0"/>
-            </a:endParaRPr>
           </a:p>
         </p:txBody>
       </p:sp>
@@ -4327,7 +4280,7 @@
           <p:cNvPr id="40" name="CuadroTexto 39">
             <a:extLst>
               <a:ext uri="{FF2B5EF4-FFF2-40B4-BE49-F238E27FC236}">
-                <a16:creationId xmlns:a16="http://schemas.microsoft.com/office/drawing/2014/main" xmlns="" id="{906857F0-A99D-4E48-8B76-CC662E771CC8}"/>
+                <a16:creationId xmlns:a16="http://schemas.microsoft.com/office/drawing/2014/main" id="{906857F0-A99D-4E48-8B76-CC662E771CC8}"/>
               </a:ext>
             </a:extLst>
           </p:cNvPr>
@@ -4357,10 +4310,6 @@
               </a:rPr>
               <a:t>-</a:t>
             </a:r>
-            <a:endParaRPr lang="en-GB" sz="1600" dirty="0">
-              <a:latin typeface="Times New Roman" panose="02020603050405020304" pitchFamily="18" charset="0"/>
-              <a:cs typeface="Times New Roman" panose="02020603050405020304" pitchFamily="18" charset="0"/>
-            </a:endParaRPr>
           </a:p>
         </p:txBody>
       </p:sp>
@@ -4369,7 +4318,7 @@
           <p:cNvPr id="41" name="CuadroTexto 40">
             <a:extLst>
               <a:ext uri="{FF2B5EF4-FFF2-40B4-BE49-F238E27FC236}">
-                <a16:creationId xmlns:a16="http://schemas.microsoft.com/office/drawing/2014/main" xmlns="" id="{C846D2DB-E992-4E7D-B013-61A84462A4AC}"/>
+                <a16:creationId xmlns:a16="http://schemas.microsoft.com/office/drawing/2014/main" id="{C846D2DB-E992-4E7D-B013-61A84462A4AC}"/>
               </a:ext>
             </a:extLst>
           </p:cNvPr>
@@ -4393,16 +4342,12 @@
           <a:lstStyle/>
           <a:p>
             <a:r>
-              <a:rPr lang="en-GB" sz="1600" dirty="0" smtClean="0">
+              <a:rPr lang="en-GB" sz="1600" dirty="0">
                 <a:latin typeface="Times New Roman" panose="02020603050405020304" pitchFamily="18" charset="0"/>
                 <a:cs typeface="Times New Roman" panose="02020603050405020304" pitchFamily="18" charset="0"/>
               </a:rPr>
               <a:t>+</a:t>
             </a:r>
-            <a:endParaRPr lang="en-GB" sz="1600" dirty="0">
-              <a:latin typeface="Times New Roman" panose="02020603050405020304" pitchFamily="18" charset="0"/>
-              <a:cs typeface="Times New Roman" panose="02020603050405020304" pitchFamily="18" charset="0"/>
-            </a:endParaRPr>
           </a:p>
         </p:txBody>
       </p:sp>
@@ -4411,7 +4356,7 @@
           <p:cNvPr id="44" name="CuadroTexto 43">
             <a:extLst>
               <a:ext uri="{FF2B5EF4-FFF2-40B4-BE49-F238E27FC236}">
-                <a16:creationId xmlns:a16="http://schemas.microsoft.com/office/drawing/2014/main" xmlns="" id="{52639F23-2C06-47DA-B0E6-3C0738B54704}"/>
+                <a16:creationId xmlns:a16="http://schemas.microsoft.com/office/drawing/2014/main" id="{52639F23-2C06-47DA-B0E6-3C0738B54704}"/>
               </a:ext>
             </a:extLst>
           </p:cNvPr>
@@ -4435,16 +4380,12 @@
           <a:lstStyle/>
           <a:p>
             <a:r>
-              <a:rPr lang="en-GB" sz="1600" dirty="0" smtClean="0">
+              <a:rPr lang="en-GB" sz="1600" dirty="0">
                 <a:latin typeface="Times New Roman" panose="02020603050405020304" pitchFamily="18" charset="0"/>
                 <a:cs typeface="Times New Roman" panose="02020603050405020304" pitchFamily="18" charset="0"/>
               </a:rPr>
               <a:t>+</a:t>
             </a:r>
-            <a:endParaRPr lang="en-GB" sz="1600" dirty="0">
-              <a:latin typeface="Times New Roman" panose="02020603050405020304" pitchFamily="18" charset="0"/>
-              <a:cs typeface="Times New Roman" panose="02020603050405020304" pitchFamily="18" charset="0"/>
-            </a:endParaRPr>
           </a:p>
         </p:txBody>
       </p:sp>
@@ -4480,6 +4421,432 @@
       </p:grpSpPr>
       <p:sp>
         <p:nvSpPr>
+          <p:cNvPr id="2" name="Rectángulo 4">
+            <a:extLst>
+              <a:ext uri="{FF2B5EF4-FFF2-40B4-BE49-F238E27FC236}">
+                <a16:creationId xmlns:a16="http://schemas.microsoft.com/office/drawing/2014/main" id="{5DF3F279-613E-E747-15FA-A3C5DFB52F0C}"/>
+              </a:ext>
+            </a:extLst>
+          </p:cNvPr>
+          <p:cNvSpPr/>
+          <p:nvPr/>
+        </p:nvSpPr>
+        <p:spPr>
+          <a:xfrm>
+            <a:off x="698110" y="2122022"/>
+            <a:ext cx="1440000" cy="1080000"/>
+          </a:xfrm>
+          <a:prstGeom prst="rect">
+            <a:avLst/>
+          </a:prstGeom>
+        </p:spPr>
+        <p:style>
+          <a:lnRef idx="2">
+            <a:schemeClr val="accent3">
+              <a:shade val="15000"/>
+            </a:schemeClr>
+          </a:lnRef>
+          <a:fillRef idx="1">
+            <a:schemeClr val="accent3"/>
+          </a:fillRef>
+          <a:effectRef idx="0">
+            <a:schemeClr val="accent3"/>
+          </a:effectRef>
+          <a:fontRef idx="minor">
+            <a:schemeClr val="lt1"/>
+          </a:fontRef>
+        </p:style>
+        <p:txBody>
+          <a:bodyPr rot="0" spcFirstLastPara="0" vertOverflow="overflow" horzOverflow="overflow" vert="horz" wrap="square" lIns="65341" tIns="32671" rIns="65341" bIns="32671" numCol="1" spcCol="0" rtlCol="0" fromWordArt="0" anchor="ctr" anchorCtr="0" forceAA="0" compatLnSpc="1">
+            <a:prstTxWarp prst="textNoShape">
+              <a:avLst/>
+            </a:prstTxWarp>
+            <a:noAutofit/>
+          </a:bodyPr>
+          <a:lstStyle/>
+          <a:p>
+            <a:pPr algn="ctr"/>
+            <a:endParaRPr lang="en-GB" sz="1286" dirty="0">
+              <a:solidFill>
+                <a:schemeClr val="tx1"/>
+              </a:solidFill>
+              <a:latin typeface="Times New Roman" panose="02020603050405020304" pitchFamily="18" charset="0"/>
+              <a:ea typeface="Lato" panose="020F0502020204030203" pitchFamily="34" charset="0"/>
+              <a:cs typeface="Times New Roman" panose="02020603050405020304" pitchFamily="18" charset="0"/>
+            </a:endParaRPr>
+          </a:p>
+        </p:txBody>
+      </p:sp>
+      <p:grpSp>
+        <p:nvGrpSpPr>
+          <p:cNvPr id="3" name="Group 2">
+            <a:extLst>
+              <a:ext uri="{FF2B5EF4-FFF2-40B4-BE49-F238E27FC236}">
+                <a16:creationId xmlns:a16="http://schemas.microsoft.com/office/drawing/2014/main" id="{E76771CE-1F5A-091B-8236-6CC6B75620E3}"/>
+              </a:ext>
+            </a:extLst>
+          </p:cNvPr>
+          <p:cNvGrpSpPr/>
+          <p:nvPr/>
+        </p:nvGrpSpPr>
+        <p:grpSpPr>
+          <a:xfrm>
+            <a:off x="788111" y="2213520"/>
+            <a:ext cx="1260000" cy="900000"/>
+            <a:chOff x="861863" y="2311538"/>
+            <a:chExt cx="1236938" cy="835932"/>
+          </a:xfrm>
+        </p:grpSpPr>
+        <p:sp>
+          <p:nvSpPr>
+            <p:cNvPr id="4" name="Rectángulo 3"/>
+            <p:cNvSpPr>
+              <a:spLocks/>
+            </p:cNvSpPr>
+            <p:nvPr/>
+          </p:nvSpPr>
+          <p:spPr>
+            <a:xfrm>
+              <a:off x="861863" y="2728113"/>
+              <a:ext cx="1236937" cy="419357"/>
+            </a:xfrm>
+            <a:prstGeom prst="rect">
+              <a:avLst/>
+            </a:prstGeom>
+            <a:ln w="3175"/>
+          </p:spPr>
+          <p:style>
+            <a:lnRef idx="2">
+              <a:schemeClr val="dk1"/>
+            </a:lnRef>
+            <a:fillRef idx="1">
+              <a:schemeClr val="lt1"/>
+            </a:fillRef>
+            <a:effectRef idx="0">
+              <a:schemeClr val="dk1"/>
+            </a:effectRef>
+            <a:fontRef idx="minor">
+              <a:schemeClr val="dk1"/>
+            </a:fontRef>
+          </p:style>
+          <p:txBody>
+            <a:bodyPr rot="0" spcFirstLastPara="0" vertOverflow="overflow" horzOverflow="overflow" vert="horz" wrap="square" lIns="65341" tIns="32671" rIns="65341" bIns="32671" numCol="1" spcCol="0" rtlCol="0" fromWordArt="0" anchor="ctr" anchorCtr="0" forceAA="0" compatLnSpc="1">
+              <a:prstTxWarp prst="textNoShape">
+                <a:avLst/>
+              </a:prstTxWarp>
+              <a:noAutofit/>
+            </a:bodyPr>
+            <a:lstStyle/>
+            <a:p>
+              <a:pPr algn="ctr"/>
+              <a:r>
+                <a:rPr lang="en-GB" sz="1286" dirty="0">
+                  <a:solidFill>
+                    <a:schemeClr val="tx1"/>
+                  </a:solidFill>
+                  <a:latin typeface="Times New Roman" panose="02020603050405020304" pitchFamily="18" charset="0"/>
+                  <a:ea typeface="Lato" panose="020F0502020204030203" pitchFamily="34" charset="0"/>
+                  <a:cs typeface="Times New Roman" panose="02020603050405020304" pitchFamily="18" charset="0"/>
+                </a:rPr>
+                <a:t>Education</a:t>
+              </a:r>
+            </a:p>
+          </p:txBody>
+        </p:sp>
+        <p:sp>
+          <p:nvSpPr>
+            <p:cNvPr id="5" name="Rectángulo 4"/>
+            <p:cNvSpPr>
+              <a:spLocks/>
+            </p:cNvSpPr>
+            <p:nvPr/>
+          </p:nvSpPr>
+          <p:spPr>
+            <a:xfrm>
+              <a:off x="861864" y="2311538"/>
+              <a:ext cx="1236937" cy="419357"/>
+            </a:xfrm>
+            <a:prstGeom prst="rect">
+              <a:avLst/>
+            </a:prstGeom>
+            <a:ln w="3175"/>
+          </p:spPr>
+          <p:style>
+            <a:lnRef idx="2">
+              <a:schemeClr val="dk1"/>
+            </a:lnRef>
+            <a:fillRef idx="1">
+              <a:schemeClr val="lt1"/>
+            </a:fillRef>
+            <a:effectRef idx="0">
+              <a:schemeClr val="dk1"/>
+            </a:effectRef>
+            <a:fontRef idx="minor">
+              <a:schemeClr val="dk1"/>
+            </a:fontRef>
+          </p:style>
+          <p:txBody>
+            <a:bodyPr rot="0" spcFirstLastPara="0" vertOverflow="overflow" horzOverflow="overflow" vert="horz" wrap="square" lIns="65341" tIns="32671" rIns="65341" bIns="32671" numCol="1" spcCol="0" rtlCol="0" fromWordArt="0" anchor="ctr" anchorCtr="0" forceAA="0" compatLnSpc="1">
+              <a:prstTxWarp prst="textNoShape">
+                <a:avLst/>
+              </a:prstTxWarp>
+              <a:noAutofit/>
+            </a:bodyPr>
+            <a:lstStyle/>
+            <a:p>
+              <a:pPr algn="ctr"/>
+              <a:r>
+                <a:rPr lang="en-GB" sz="1286" dirty="0">
+                  <a:solidFill>
+                    <a:schemeClr val="tx1"/>
+                  </a:solidFill>
+                  <a:latin typeface="Times New Roman" panose="02020603050405020304" pitchFamily="18" charset="0"/>
+                  <a:ea typeface="Lato" panose="020F0502020204030203" pitchFamily="34" charset="0"/>
+                  <a:cs typeface="Times New Roman" panose="02020603050405020304" pitchFamily="18" charset="0"/>
+                </a:rPr>
+                <a:t>Income</a:t>
+              </a:r>
+            </a:p>
+          </p:txBody>
+        </p:sp>
+      </p:grpSp>
+      <p:sp>
+        <p:nvSpPr>
+          <p:cNvPr id="7" name="Rectángulo 6"/>
+          <p:cNvSpPr/>
+          <p:nvPr/>
+        </p:nvSpPr>
+        <p:spPr>
+          <a:xfrm>
+            <a:off x="5126666" y="2394551"/>
+            <a:ext cx="1456575" cy="534941"/>
+          </a:xfrm>
+          <a:prstGeom prst="rect">
+            <a:avLst/>
+          </a:prstGeom>
+        </p:spPr>
+        <p:style>
+          <a:lnRef idx="2">
+            <a:schemeClr val="dk1"/>
+          </a:lnRef>
+          <a:fillRef idx="1">
+            <a:schemeClr val="lt1"/>
+          </a:fillRef>
+          <a:effectRef idx="0">
+            <a:schemeClr val="dk1"/>
+          </a:effectRef>
+          <a:fontRef idx="minor">
+            <a:schemeClr val="dk1"/>
+          </a:fontRef>
+        </p:style>
+        <p:txBody>
+          <a:bodyPr rot="0" spcFirstLastPara="0" vertOverflow="overflow" horzOverflow="overflow" vert="horz" wrap="square" lIns="65341" tIns="32671" rIns="65341" bIns="32671" numCol="1" spcCol="0" rtlCol="0" fromWordArt="0" anchor="ctr" anchorCtr="0" forceAA="0" compatLnSpc="1">
+            <a:prstTxWarp prst="textNoShape">
+              <a:avLst/>
+            </a:prstTxWarp>
+            <a:noAutofit/>
+          </a:bodyPr>
+          <a:lstStyle/>
+          <a:p>
+            <a:pPr algn="ctr"/>
+            <a:r>
+              <a:rPr lang="en-GB" sz="1286" dirty="0">
+                <a:solidFill>
+                  <a:schemeClr val="tx1"/>
+                </a:solidFill>
+                <a:latin typeface="Times New Roman" panose="02020603050405020304" pitchFamily="18" charset="0"/>
+                <a:ea typeface="Lato" panose="020F0502020204030203" pitchFamily="34" charset="0"/>
+                <a:cs typeface="Times New Roman" panose="02020603050405020304" pitchFamily="18" charset="0"/>
+              </a:rPr>
+              <a:t>Meritocracy</a:t>
+            </a:r>
+          </a:p>
+          <a:p>
+            <a:pPr algn="ctr"/>
+            <a:r>
+              <a:rPr lang="en-GB" sz="1286" dirty="0">
+                <a:solidFill>
+                  <a:schemeClr val="tx1"/>
+                </a:solidFill>
+                <a:latin typeface="Times New Roman" panose="02020603050405020304" pitchFamily="18" charset="0"/>
+                <a:ea typeface="Lato" panose="020F0502020204030203" pitchFamily="34" charset="0"/>
+                <a:cs typeface="Times New Roman" panose="02020603050405020304" pitchFamily="18" charset="0"/>
+              </a:rPr>
+              <a:t>Perception</a:t>
+            </a:r>
+          </a:p>
+        </p:txBody>
+      </p:sp>
+      <p:sp>
+        <p:nvSpPr>
+          <p:cNvPr id="47" name="Rectángulo 46"/>
+          <p:cNvSpPr/>
+          <p:nvPr/>
+        </p:nvSpPr>
+        <p:spPr>
+          <a:xfrm>
+            <a:off x="2847986" y="771300"/>
+            <a:ext cx="1260000" cy="432000"/>
+          </a:xfrm>
+          <a:prstGeom prst="rect">
+            <a:avLst/>
+          </a:prstGeom>
+        </p:spPr>
+        <p:style>
+          <a:lnRef idx="2">
+            <a:schemeClr val="dk1"/>
+          </a:lnRef>
+          <a:fillRef idx="1">
+            <a:schemeClr val="lt1"/>
+          </a:fillRef>
+          <a:effectRef idx="0">
+            <a:schemeClr val="dk1"/>
+          </a:effectRef>
+          <a:fontRef idx="minor">
+            <a:schemeClr val="dk1"/>
+          </a:fontRef>
+        </p:style>
+        <p:txBody>
+          <a:bodyPr rot="0" spcFirstLastPara="0" vertOverflow="overflow" horzOverflow="overflow" vert="horz" wrap="square" lIns="65341" tIns="32671" rIns="65341" bIns="32671" numCol="1" spcCol="0" rtlCol="0" fromWordArt="0" anchor="ctr" anchorCtr="0" forceAA="0" compatLnSpc="1">
+            <a:prstTxWarp prst="textNoShape">
+              <a:avLst/>
+            </a:prstTxWarp>
+            <a:noAutofit/>
+          </a:bodyPr>
+          <a:lstStyle/>
+          <a:p>
+            <a:pPr algn="ctr"/>
+            <a:r>
+              <a:rPr lang="en-GB" sz="1200" dirty="0">
+                <a:solidFill>
+                  <a:schemeClr val="tx1"/>
+                </a:solidFill>
+                <a:latin typeface="Times New Roman" panose="02020603050405020304" pitchFamily="18" charset="0"/>
+                <a:ea typeface="Lato" panose="020F0502020204030203" pitchFamily="34" charset="0"/>
+                <a:cs typeface="Times New Roman" panose="02020603050405020304" pitchFamily="18" charset="0"/>
+              </a:rPr>
+              <a:t>Subjective social status</a:t>
+            </a:r>
+          </a:p>
+        </p:txBody>
+      </p:sp>
+      <p:cxnSp>
+        <p:nvCxnSpPr>
+          <p:cNvPr id="21" name="Conector recto de flecha 20">
+            <a:extLst>
+              <a:ext uri="{FF2B5EF4-FFF2-40B4-BE49-F238E27FC236}">
+                <a16:creationId xmlns:a16="http://schemas.microsoft.com/office/drawing/2014/main" id="{4A4C4BF0-8ECD-4895-8508-B1FFCCDE4B3F}"/>
+              </a:ext>
+            </a:extLst>
+          </p:cNvPr>
+          <p:cNvCxnSpPr>
+            <a:cxnSpLocks/>
+            <a:stCxn id="47" idx="2"/>
+          </p:cNvCxnSpPr>
+          <p:nvPr/>
+        </p:nvCxnSpPr>
+        <p:spPr>
+          <a:xfrm>
+            <a:off x="3477986" y="1203300"/>
+            <a:ext cx="0" cy="1440000"/>
+          </a:xfrm>
+          <a:prstGeom prst="straightConnector1">
+            <a:avLst/>
+          </a:prstGeom>
+          <a:ln>
+            <a:tailEnd type="triangle"/>
+          </a:ln>
+        </p:spPr>
+        <p:style>
+          <a:lnRef idx="3">
+            <a:schemeClr val="dk1"/>
+          </a:lnRef>
+          <a:fillRef idx="0">
+            <a:schemeClr val="dk1"/>
+          </a:fillRef>
+          <a:effectRef idx="2">
+            <a:schemeClr val="dk1"/>
+          </a:effectRef>
+          <a:fontRef idx="minor">
+            <a:schemeClr val="tx1"/>
+          </a:fontRef>
+        </p:style>
+      </p:cxnSp>
+      <p:cxnSp>
+        <p:nvCxnSpPr>
+          <p:cNvPr id="13" name="Conector recto de flecha 20">
+            <a:extLst>
+              <a:ext uri="{FF2B5EF4-FFF2-40B4-BE49-F238E27FC236}">
+                <a16:creationId xmlns:a16="http://schemas.microsoft.com/office/drawing/2014/main" id="{D9B815FF-49E8-8E03-A1EF-54A81444BE7C}"/>
+              </a:ext>
+            </a:extLst>
+          </p:cNvPr>
+          <p:cNvCxnSpPr>
+            <a:cxnSpLocks/>
+            <a:stCxn id="2" idx="3"/>
+            <a:endCxn id="7" idx="1"/>
+          </p:cNvCxnSpPr>
+          <p:nvPr/>
+        </p:nvCxnSpPr>
+        <p:spPr>
+          <a:xfrm>
+            <a:off x="2138110" y="2662022"/>
+            <a:ext cx="2988556" cy="0"/>
+          </a:xfrm>
+          <a:prstGeom prst="straightConnector1">
+            <a:avLst/>
+          </a:prstGeom>
+          <a:ln>
+            <a:tailEnd type="triangle"/>
+          </a:ln>
+        </p:spPr>
+        <p:style>
+          <a:lnRef idx="3">
+            <a:schemeClr val="dk1"/>
+          </a:lnRef>
+          <a:fillRef idx="0">
+            <a:schemeClr val="dk1"/>
+          </a:fillRef>
+          <a:effectRef idx="2">
+            <a:schemeClr val="dk1"/>
+          </a:effectRef>
+          <a:fontRef idx="minor">
+            <a:schemeClr val="tx1"/>
+          </a:fontRef>
+        </p:style>
+      </p:cxnSp>
+    </p:spTree>
+    <p:extLst>
+      <p:ext uri="{BB962C8B-B14F-4D97-AF65-F5344CB8AC3E}">
+        <p14:creationId xmlns:p14="http://schemas.microsoft.com/office/powerpoint/2010/main" val="421356811"/>
+      </p:ext>
+    </p:extLst>
+  </p:cSld>
+  <p:clrMapOvr>
+    <a:masterClrMapping/>
+  </p:clrMapOvr>
+</p:sld>
+</file>
+
+<file path=ppt/slides/slide3.xml><?xml version="1.0" encoding="utf-8"?>
+<p:sld xmlns:a="http://schemas.openxmlformats.org/drawingml/2006/main" xmlns:r="http://schemas.openxmlformats.org/officeDocument/2006/relationships" xmlns:p="http://schemas.openxmlformats.org/presentationml/2006/main">
+  <p:cSld>
+    <p:spTree>
+      <p:nvGrpSpPr>
+        <p:cNvPr id="1" name=""/>
+        <p:cNvGrpSpPr/>
+        <p:nvPr/>
+      </p:nvGrpSpPr>
+      <p:grpSpPr>
+        <a:xfrm>
+          <a:off x="0" y="0"/>
+          <a:ext cx="0" cy="0"/>
+          <a:chOff x="0" y="0"/>
+          <a:chExt cx="0" cy="0"/>
+        </a:xfrm>
+      </p:grpSpPr>
+      <p:sp>
+        <p:nvSpPr>
           <p:cNvPr id="4" name="Rectángulo 3"/>
           <p:cNvSpPr/>
           <p:nvPr/>
@@ -4899,7 +5266,7 @@
           <p:cNvPr id="21" name="Conector recto de flecha 20">
             <a:extLst>
               <a:ext uri="{FF2B5EF4-FFF2-40B4-BE49-F238E27FC236}">
-                <a16:creationId xmlns:a16="http://schemas.microsoft.com/office/drawing/2014/main" xmlns="" id="{4A4C4BF0-8ECD-4895-8508-B1FFCCDE4B3F}"/>
+                <a16:creationId xmlns:a16="http://schemas.microsoft.com/office/drawing/2014/main" id="{4A4C4BF0-8ECD-4895-8508-B1FFCCDE4B3F}"/>
               </a:ext>
             </a:extLst>
           </p:cNvPr>
@@ -4943,7 +5310,7 @@
               <p:cNvPr id="10" name="CuadroTexto 9">
                 <a:extLst>
                   <a:ext uri="{FF2B5EF4-FFF2-40B4-BE49-F238E27FC236}">
-                    <a16:creationId xmlns:a16="http://schemas.microsoft.com/office/drawing/2014/main" xmlns="" id="{8C5B2872-328E-49A9-9409-7B43744BEA2B}"/>
+                    <a16:creationId xmlns:a16="http://schemas.microsoft.com/office/drawing/2014/main" id="{8C5B2872-328E-49A9-9409-7B43744BEA2B}"/>
                   </a:ext>
                 </a:extLst>
               </p:cNvPr>
@@ -5064,7 +5431,7 @@
               <p:cNvPr id="25" name="CuadroTexto 24">
                 <a:extLst>
                   <a:ext uri="{FF2B5EF4-FFF2-40B4-BE49-F238E27FC236}">
-                    <a16:creationId xmlns:a16="http://schemas.microsoft.com/office/drawing/2014/main" xmlns="" id="{F55E9C88-8DB4-4D07-9D5F-105FDCF6F8A0}"/>
+                    <a16:creationId xmlns:a16="http://schemas.microsoft.com/office/drawing/2014/main" id="{F55E9C88-8DB4-4D07-9D5F-105FDCF6F8A0}"/>
                   </a:ext>
                 </a:extLst>
               </p:cNvPr>
@@ -5185,7 +5552,7 @@
               <p:cNvPr id="26" name="CuadroTexto 25">
                 <a:extLst>
                   <a:ext uri="{FF2B5EF4-FFF2-40B4-BE49-F238E27FC236}">
-                    <a16:creationId xmlns:a16="http://schemas.microsoft.com/office/drawing/2014/main" xmlns="" id="{F9CF2996-BE9D-42EB-9DD9-1313A1FF151E}"/>
+                    <a16:creationId xmlns:a16="http://schemas.microsoft.com/office/drawing/2014/main" id="{F9CF2996-BE9D-42EB-9DD9-1313A1FF151E}"/>
                   </a:ext>
                 </a:extLst>
               </p:cNvPr>
@@ -5304,7 +5671,7 @@
           <p:cNvPr id="28" name="Conector recto de flecha 27">
             <a:extLst>
               <a:ext uri="{FF2B5EF4-FFF2-40B4-BE49-F238E27FC236}">
-                <a16:creationId xmlns:a16="http://schemas.microsoft.com/office/drawing/2014/main" xmlns="" id="{110395F9-AB89-4A6A-B396-F3C1FBC4B0D2}"/>
+                <a16:creationId xmlns:a16="http://schemas.microsoft.com/office/drawing/2014/main" id="{110395F9-AB89-4A6A-B396-F3C1FBC4B0D2}"/>
               </a:ext>
             </a:extLst>
           </p:cNvPr>
@@ -5346,7 +5713,7 @@
           <p:cNvPr id="31" name="Conector recto de flecha 30">
             <a:extLst>
               <a:ext uri="{FF2B5EF4-FFF2-40B4-BE49-F238E27FC236}">
-                <a16:creationId xmlns:a16="http://schemas.microsoft.com/office/drawing/2014/main" xmlns="" id="{EF32652A-3281-4CE6-BCA9-28DF3F638B4C}"/>
+                <a16:creationId xmlns:a16="http://schemas.microsoft.com/office/drawing/2014/main" id="{EF32652A-3281-4CE6-BCA9-28DF3F638B4C}"/>
               </a:ext>
             </a:extLst>
           </p:cNvPr>
@@ -5390,7 +5757,7 @@
               <p:cNvPr id="36" name="CuadroTexto 35">
                 <a:extLst>
                   <a:ext uri="{FF2B5EF4-FFF2-40B4-BE49-F238E27FC236}">
-                    <a16:creationId xmlns:a16="http://schemas.microsoft.com/office/drawing/2014/main" xmlns="" id="{2FA14FB4-213C-4E79-B533-1C031129435A}"/>
+                    <a16:creationId xmlns:a16="http://schemas.microsoft.com/office/drawing/2014/main" id="{2FA14FB4-213C-4E79-B533-1C031129435A}"/>
                   </a:ext>
                 </a:extLst>
               </p:cNvPr>
@@ -5505,7 +5872,7 @@
               <p:cNvPr id="37" name="CuadroTexto 36">
                 <a:extLst>
                   <a:ext uri="{FF2B5EF4-FFF2-40B4-BE49-F238E27FC236}">
-                    <a16:creationId xmlns:a16="http://schemas.microsoft.com/office/drawing/2014/main" xmlns="" id="{A07E0013-787A-42E1-B306-241225EE0342}"/>
+                    <a16:creationId xmlns:a16="http://schemas.microsoft.com/office/drawing/2014/main" id="{A07E0013-787A-42E1-B306-241225EE0342}"/>
                   </a:ext>
                 </a:extLst>
               </p:cNvPr>
@@ -5634,7 +6001,7 @@
           <p:cNvPr id="24" name="CuadroTexto 23">
             <a:extLst>
               <a:ext uri="{FF2B5EF4-FFF2-40B4-BE49-F238E27FC236}">
-                <a16:creationId xmlns:a16="http://schemas.microsoft.com/office/drawing/2014/main" xmlns="" id="{20ED6ECD-489B-442A-9F77-D977C45F2099}"/>
+                <a16:creationId xmlns:a16="http://schemas.microsoft.com/office/drawing/2014/main" id="{20ED6ECD-489B-442A-9F77-D977C45F2099}"/>
               </a:ext>
             </a:extLst>
           </p:cNvPr>
@@ -5669,7 +6036,7 @@
           <p:cNvPr id="39" name="CuadroTexto 38">
             <a:extLst>
               <a:ext uri="{FF2B5EF4-FFF2-40B4-BE49-F238E27FC236}">
-                <a16:creationId xmlns:a16="http://schemas.microsoft.com/office/drawing/2014/main" xmlns="" id="{5730C6D8-C76C-4678-93D3-E5FD2745115B}"/>
+                <a16:creationId xmlns:a16="http://schemas.microsoft.com/office/drawing/2014/main" id="{5730C6D8-C76C-4678-93D3-E5FD2745115B}"/>
               </a:ext>
             </a:extLst>
           </p:cNvPr>
@@ -5704,7 +6071,7 @@
           <p:cNvPr id="40" name="CuadroTexto 39">
             <a:extLst>
               <a:ext uri="{FF2B5EF4-FFF2-40B4-BE49-F238E27FC236}">
-                <a16:creationId xmlns:a16="http://schemas.microsoft.com/office/drawing/2014/main" xmlns="" id="{906857F0-A99D-4E48-8B76-CC662E771CC8}"/>
+                <a16:creationId xmlns:a16="http://schemas.microsoft.com/office/drawing/2014/main" id="{906857F0-A99D-4E48-8B76-CC662E771CC8}"/>
               </a:ext>
             </a:extLst>
           </p:cNvPr>
@@ -5740,7 +6107,7 @@
           <p:cNvPr id="41" name="CuadroTexto 40">
             <a:extLst>
               <a:ext uri="{FF2B5EF4-FFF2-40B4-BE49-F238E27FC236}">
-                <a16:creationId xmlns:a16="http://schemas.microsoft.com/office/drawing/2014/main" xmlns="" id="{C846D2DB-E992-4E7D-B013-61A84462A4AC}"/>
+                <a16:creationId xmlns:a16="http://schemas.microsoft.com/office/drawing/2014/main" id="{C846D2DB-E992-4E7D-B013-61A84462A4AC}"/>
               </a:ext>
             </a:extLst>
           </p:cNvPr>
@@ -5779,7 +6146,7 @@
           <p:cNvPr id="44" name="CuadroTexto 43">
             <a:extLst>
               <a:ext uri="{FF2B5EF4-FFF2-40B4-BE49-F238E27FC236}">
-                <a16:creationId xmlns:a16="http://schemas.microsoft.com/office/drawing/2014/main" xmlns="" id="{52639F23-2C06-47DA-B0E6-3C0738B54704}"/>
+                <a16:creationId xmlns:a16="http://schemas.microsoft.com/office/drawing/2014/main" id="{52639F23-2C06-47DA-B0E6-3C0738B54704}"/>
               </a:ext>
             </a:extLst>
           </p:cNvPr>

</xml_diff>